<commit_message>
started experiments with chp
</commit_message>
<xml_diff>
--- a/literature/egs_chp_feasible_space.pptx
+++ b/literature/egs_chp_feasible_space.pptx
@@ -4712,10 +4712,10 @@
       </mc:AlternateContent>
       <p:pic>
         <p:nvPicPr>
-          <p:cNvPr id="30" name="Picture 29">
-            <a:extLst>
-              <a:ext uri="{FF2B5EF4-FFF2-40B4-BE49-F238E27FC236}">
-                <a16:creationId xmlns:a16="http://schemas.microsoft.com/office/drawing/2014/main" id="{962900A2-A483-69AB-BD0E-F1525BE3FA99}"/>
+          <p:cNvPr id="32" name="Picture 31">
+            <a:extLst>
+              <a:ext uri="{FF2B5EF4-FFF2-40B4-BE49-F238E27FC236}">
+                <a16:creationId xmlns:a16="http://schemas.microsoft.com/office/drawing/2014/main" id="{E9971648-A3C3-3214-36E4-F7D7051FF9FB}"/>
               </a:ext>
             </a:extLst>
           </p:cNvPr>
@@ -4732,8 +4732,8 @@
         </p:blipFill>
         <p:spPr>
           <a:xfrm>
-            <a:off x="6157752" y="781032"/>
-            <a:ext cx="5833176" cy="4192128"/>
+            <a:off x="6227713" y="839745"/>
+            <a:ext cx="5660075" cy="4152207"/>
           </a:xfrm>
           <a:prstGeom prst="rect">
             <a:avLst/>

</xml_diff>